<commit_message>
Cleanup in powerpoint presentation
</commit_message>
<xml_diff>
--- a/OpenClosedPrinciple.pptx
+++ b/OpenClosedPrinciple.pptx
@@ -4642,18 +4642,44 @@
         </p:nvSpPr>
         <p:spPr/>
         <p:txBody>
-          <a:bodyPr/>
+          <a:bodyPr>
+            <a:normAutofit lnSpcReduction="10000"/>
+          </a:bodyPr>
           <a:lstStyle/>
           <a:p>
             <a:r>
               <a:rPr lang="nb-NO" dirty="0" smtClean="0"/>
-              <a:t>Fra tidlig objektorientering Bertrand Meyer</a:t>
-            </a:r>
-          </a:p>
-          <a:p>
+              <a:t>Stammer fra </a:t>
+            </a:r>
             <a:r>
               <a:rPr lang="nb-NO" dirty="0" smtClean="0"/>
-              <a:t>Språket var </a:t>
+              <a:t>tidlig </a:t>
+            </a:r>
+            <a:r>
+              <a:rPr lang="nb-NO" dirty="0" smtClean="0"/>
+              <a:t>objektorientering</a:t>
+            </a:r>
+          </a:p>
+          <a:p>
+            <a:pPr lvl="1"/>
+            <a:r>
+              <a:rPr lang="nb-NO" dirty="0" smtClean="0"/>
+              <a:t>Ble først beskrevet av Bertrand Meyer i 1988 i Object </a:t>
+            </a:r>
+            <a:r>
+              <a:rPr lang="nb-NO" dirty="0" err="1" smtClean="0"/>
+              <a:t>Oriented</a:t>
+            </a:r>
+            <a:r>
+              <a:rPr lang="nb-NO" dirty="0" smtClean="0"/>
+              <a:t> Software Construction.</a:t>
+            </a:r>
+          </a:p>
+          <a:p>
+            <a:pPr lvl="1"/>
+            <a:r>
+              <a:rPr lang="nb-NO" dirty="0" smtClean="0"/>
+              <a:t>Språket i boken er </a:t>
             </a:r>
             <a:r>
               <a:rPr lang="nb-NO" dirty="0" err="1" smtClean="0"/>
@@ -4661,7 +4687,7 @@
             </a:r>
             <a:r>
               <a:rPr lang="nb-NO" dirty="0" smtClean="0"/>
-              <a:t>, </a:t>
+              <a:t>, et </a:t>
             </a:r>
             <a:r>
               <a:rPr lang="nb-NO" dirty="0" err="1" smtClean="0"/>
@@ -4671,11 +4697,12 @@
               <a:rPr lang="nb-NO" dirty="0" smtClean="0"/>
               <a:t> språk med multippel arv og templating</a:t>
             </a:r>
+            <a:endParaRPr lang="nb-NO" dirty="0" smtClean="0"/>
           </a:p>
           <a:p>
             <a:r>
               <a:rPr lang="nb-NO" dirty="0" smtClean="0"/>
-              <a:t>Derfor passer kanskje ikke Open/</a:t>
+              <a:t>Open/</a:t>
             </a:r>
             <a:r>
               <a:rPr lang="nb-NO" dirty="0" err="1" smtClean="0"/>
@@ -4683,13 +4710,42 @@
             </a:r>
             <a:r>
               <a:rPr lang="nb-NO" dirty="0" smtClean="0"/>
-              <a:t> like godt i C# og Java, men grunnleggende ide er viktig og riktig.</a:t>
-            </a:r>
-          </a:p>
-          <a:p>
+              <a:t> fungerer ikke like </a:t>
+            </a:r>
             <a:r>
               <a:rPr lang="nb-NO" dirty="0" smtClean="0"/>
-              <a:t>Design by </a:t>
+              <a:t>godt i C# og </a:t>
+            </a:r>
+            <a:r>
+              <a:rPr lang="nb-NO" dirty="0" smtClean="0"/>
+              <a:t>Java som i </a:t>
+            </a:r>
+            <a:r>
+              <a:rPr lang="nb-NO" dirty="0" err="1" smtClean="0"/>
+              <a:t>Eiffel</a:t>
+            </a:r>
+            <a:r>
+              <a:rPr lang="nb-NO" dirty="0" smtClean="0"/>
+              <a:t>, </a:t>
+            </a:r>
+            <a:r>
+              <a:rPr lang="nb-NO" dirty="0" smtClean="0"/>
+              <a:t>men </a:t>
+            </a:r>
+            <a:r>
+              <a:rPr lang="nb-NO" dirty="0" smtClean="0"/>
+              <a:t>prinsippene er riktige og viktige</a:t>
+            </a:r>
+            <a:r>
+              <a:rPr lang="nb-NO" dirty="0" smtClean="0"/>
+              <a:t>.</a:t>
+            </a:r>
+            <a:endParaRPr lang="nb-NO" dirty="0" smtClean="0"/>
+          </a:p>
+          <a:p>
+            <a:r>
+              <a:rPr lang="nb-NO" dirty="0" smtClean="0"/>
+              <a:t>«Design by </a:t>
             </a:r>
             <a:r>
               <a:rPr lang="nb-NO" dirty="0" err="1" smtClean="0"/>
@@ -4697,13 +4753,25 @@
             </a:r>
             <a:r>
               <a:rPr lang="nb-NO" dirty="0" smtClean="0"/>
-              <a:t> er etterfølger etter de grunnleggende prinsippene</a:t>
-            </a:r>
-          </a:p>
-          <a:p>
+              <a:t>» </a:t>
+            </a:r>
             <a:r>
               <a:rPr lang="nb-NO" dirty="0" smtClean="0"/>
-              <a:t>Ikke mulig å følge OCP 100%</a:t>
+              <a:t>er etterfølger etter de grunnleggende prinsippene</a:t>
+            </a:r>
+          </a:p>
+          <a:p>
+            <a:r>
+              <a:rPr lang="nb-NO" dirty="0" smtClean="0"/>
+              <a:t>Ikke </a:t>
+            </a:r>
+            <a:r>
+              <a:rPr lang="nb-NO" dirty="0" smtClean="0"/>
+              <a:t>mulig eller ønskelig </a:t>
+            </a:r>
+            <a:r>
+              <a:rPr lang="nb-NO" dirty="0" smtClean="0"/>
+              <a:t>å følge OCP 100%</a:t>
             </a:r>
           </a:p>
           <a:p>
@@ -4852,7 +4920,9 @@
         </p:nvSpPr>
         <p:spPr/>
         <p:txBody>
-          <a:bodyPr/>
+          <a:bodyPr>
+            <a:normAutofit fontScale="92500" lnSpcReduction="10000"/>
+          </a:bodyPr>
           <a:lstStyle/>
           <a:p>
             <a:r>
@@ -4879,7 +4949,22 @@
             <a:pPr lvl="1"/>
             <a:r>
               <a:rPr lang="nb-NO" dirty="0" smtClean="0"/>
-              <a:t>Ikke nødvendigvis arv (abstraksjon, </a:t>
+              <a:t>Ikke nødvendigvis </a:t>
+            </a:r>
+            <a:r>
+              <a:rPr lang="nb-NO" dirty="0" smtClean="0"/>
+              <a:t>arv</a:t>
+            </a:r>
+          </a:p>
+          <a:p>
+            <a:pPr lvl="1"/>
+            <a:r>
+              <a:rPr lang="nb-NO" dirty="0" smtClean="0"/>
+              <a:t>Abstraksjon</a:t>
+            </a:r>
+            <a:r>
+              <a:rPr lang="nb-NO" dirty="0" smtClean="0"/>
+              <a:t>, </a:t>
             </a:r>
             <a:r>
               <a:rPr lang="nb-NO" dirty="0" err="1" smtClean="0"/>
@@ -4887,16 +4972,13 @@
             </a:r>
             <a:r>
               <a:rPr lang="nb-NO" dirty="0" smtClean="0"/>
-              <a:t>, </a:t>
+              <a:t> og </a:t>
             </a:r>
             <a:r>
               <a:rPr lang="nb-NO" dirty="0" err="1" smtClean="0"/>
               <a:t>delegation</a:t>
             </a:r>
-            <a:r>
-              <a:rPr lang="nb-NO" dirty="0" smtClean="0"/>
-              <a:t>)</a:t>
-            </a:r>
+            <a:endParaRPr lang="nb-NO" dirty="0" smtClean="0"/>
           </a:p>
           <a:p>
             <a:r>
@@ -4924,14 +5006,18 @@
             <a:pPr lvl="1"/>
             <a:r>
               <a:rPr lang="nb-NO" dirty="0" smtClean="0"/>
-              <a:t>Opprinnelig ikke endre på kildekode. Dette er for strengt.</a:t>
+              <a:t>Opprinnelig prinsipp var at kildekode skal være stengt for endringer. </a:t>
+            </a:r>
+            <a:r>
+              <a:rPr lang="nb-NO" dirty="0" smtClean="0"/>
+              <a:t>Dette er for strengt.</a:t>
             </a:r>
           </a:p>
           <a:p>
             <a:pPr lvl="2"/>
             <a:r>
               <a:rPr lang="nb-NO" dirty="0" smtClean="0"/>
-              <a:t>Strategic </a:t>
+              <a:t>«Strategic </a:t>
             </a:r>
             <a:r>
               <a:rPr lang="nb-NO" dirty="0" err="1" smtClean="0"/>
@@ -4939,8 +5025,25 @@
             </a:r>
             <a:r>
               <a:rPr lang="nb-NO" dirty="0" smtClean="0"/>
-              <a:t>. Bestemme hva man vil beskytte for endringer, og hva som skal være åpent.</a:t>
-            </a:r>
+              <a:t>». </a:t>
+            </a:r>
+            <a:r>
+              <a:rPr lang="nb-NO" dirty="0" smtClean="0"/>
+              <a:t>Bestemme hva </a:t>
+            </a:r>
+            <a:r>
+              <a:rPr lang="nb-NO" dirty="0" smtClean="0"/>
+              <a:t>som skal være stengt, hva </a:t>
+            </a:r>
+            <a:r>
+              <a:rPr lang="nb-NO" dirty="0" smtClean="0"/>
+              <a:t>som skal være </a:t>
+            </a:r>
+            <a:r>
+              <a:rPr lang="nb-NO" dirty="0" smtClean="0"/>
+              <a:t>åpent, og hvordan det skal være åpent.</a:t>
+            </a:r>
+            <a:endParaRPr lang="nb-NO" dirty="0" smtClean="0"/>
           </a:p>
           <a:p>
             <a:pPr lvl="1"/>
@@ -4953,8 +5056,20 @@
             <a:pPr lvl="2"/>
             <a:r>
               <a:rPr lang="nb-NO" dirty="0" smtClean="0"/>
-              <a:t>Ikke nye funksjoner/metoder</a:t>
-            </a:r>
+              <a:t>Ikke nye </a:t>
+            </a:r>
+            <a:r>
+              <a:rPr lang="nb-NO" dirty="0" smtClean="0"/>
+              <a:t>funksjoner/metoder</a:t>
+            </a:r>
+          </a:p>
+          <a:p>
+            <a:pPr lvl="2"/>
+            <a:r>
+              <a:rPr lang="nb-NO" dirty="0" smtClean="0"/>
+              <a:t>Ikke endre funksjoner/metoder</a:t>
+            </a:r>
+            <a:endParaRPr lang="nb-NO" dirty="0" smtClean="0"/>
           </a:p>
         </p:txBody>
       </p:sp>
@@ -6246,6 +6361,23 @@
 </file>
 
 <file path=customXml/item1.xml><?xml version="1.0" encoding="utf-8"?>
+<?mso-contentType ?>
+<FormTemplates xmlns="http://schemas.microsoft.com/sharepoint/v3/contenttype/forms">
+  <Display>DocumentLibraryForm</Display>
+  <Edit>DocumentLibraryForm</Edit>
+  <New>DocumentLibraryForm</New>
+</FormTemplates>
+</file>
+
+<file path=customXml/item2.xml><?xml version="1.0" encoding="utf-8"?>
+<p:properties xmlns:p="http://schemas.microsoft.com/office/2006/metadata/properties" xmlns:xsi="http://www.w3.org/2001/XMLSchema-instance">
+  <documentManagement>
+    <TopicId xmlns="01e230a7-93a4-4d42-896c-9e0ac63adbaa" xsi:nil="true"/>
+  </documentManagement>
+</p:properties>
+</file>
+
+<file path=customXml/item3.xml><?xml version="1.0" encoding="utf-8"?>
 <ct:contentTypeSchema xmlns:ct="http://schemas.microsoft.com/office/2006/metadata/contentType" xmlns:ma="http://schemas.microsoft.com/office/2006/metadata/properties/metaAttributes" ct:_="" ma:_="" ma:contentTypeName="Document" ma:contentTypeID="0x0101003AEC10B5DB4D4C498C6092330F2E2392" ma:contentTypeVersion="0" ma:contentTypeDescription="Create a new document." ma:contentTypeScope="" ma:versionID="05b8c8acf6199673415ecb207baa50c7">
   <xsd:schema xmlns:xsd="http://www.w3.org/2001/XMLSchema" xmlns:p="http://schemas.microsoft.com/office/2006/metadata/properties" xmlns:ns2="01e230a7-93a4-4d42-896c-9e0ac63adbaa" targetNamespace="http://schemas.microsoft.com/office/2006/metadata/properties" ma:root="true" ma:fieldsID="e7064f479bd5ad9960cca567e0686db3" ns2:_="">
     <xsd:import namespace="01e230a7-93a4-4d42-896c-9e0ac63adbaa"/>
@@ -6305,36 +6437,10 @@
 </ct:contentTypeSchema>
 </file>
 
-<file path=customXml/item2.xml><?xml version="1.0" encoding="utf-8"?>
-<p:properties xmlns:p="http://schemas.microsoft.com/office/2006/metadata/properties" xmlns:xsi="http://www.w3.org/2001/XMLSchema-instance">
-  <documentManagement>
-    <TopicId xmlns="01e230a7-93a4-4d42-896c-9e0ac63adbaa" xsi:nil="true"/>
-  </documentManagement>
-</p:properties>
-</file>
-
-<file path=customXml/item3.xml><?xml version="1.0" encoding="utf-8"?>
-<?mso-contentType ?>
-<FormTemplates xmlns="http://schemas.microsoft.com/sharepoint/v3/contenttype/forms">
-  <Display>DocumentLibraryForm</Display>
-  <Edit>DocumentLibraryForm</Edit>
-  <New>DocumentLibraryForm</New>
-</FormTemplates>
-</file>
-
 <file path=customXml/itemProps1.xml><?xml version="1.0" encoding="utf-8"?>
-<ds:datastoreItem xmlns:ds="http://schemas.openxmlformats.org/officeDocument/2006/customXml" ds:itemID="{40AC1BE3-0ECC-4682-95BA-BFCE5BC2C53F}">
+<ds:datastoreItem xmlns:ds="http://schemas.openxmlformats.org/officeDocument/2006/customXml" ds:itemID="{AB3985EB-A20D-413F-870C-F434910CF0FB}">
   <ds:schemaRefs>
-    <ds:schemaRef ds:uri="http://schemas.microsoft.com/office/2006/metadata/contentType"/>
-    <ds:schemaRef ds:uri="http://schemas.microsoft.com/office/2006/metadata/properties/metaAttributes"/>
-    <ds:schemaRef ds:uri="http://www.w3.org/2001/XMLSchema"/>
-    <ds:schemaRef ds:uri="http://schemas.microsoft.com/office/2006/metadata/properties"/>
-    <ds:schemaRef ds:uri="01e230a7-93a4-4d42-896c-9e0ac63adbaa"/>
-    <ds:schemaRef ds:uri="http://schemas.microsoft.com/office/2006/documentManagement/types"/>
-    <ds:schemaRef ds:uri="http://schemas.openxmlformats.org/package/2006/metadata/core-properties"/>
-    <ds:schemaRef ds:uri="http://purl.org/dc/elements/1.1/"/>
-    <ds:schemaRef ds:uri="http://purl.org/dc/terms/"/>
-    <ds:schemaRef ds:uri="http://schemas.microsoft.com/office/internal/2005/internalDocumentation"/>
+    <ds:schemaRef ds:uri="http://schemas.microsoft.com/sharepoint/v3/contenttype/forms"/>
   </ds:schemaRefs>
 </ds:datastoreItem>
 </file>
@@ -6355,9 +6461,18 @@
 </file>
 
 <file path=customXml/itemProps3.xml><?xml version="1.0" encoding="utf-8"?>
-<ds:datastoreItem xmlns:ds="http://schemas.openxmlformats.org/officeDocument/2006/customXml" ds:itemID="{AB3985EB-A20D-413F-870C-F434910CF0FB}">
+<ds:datastoreItem xmlns:ds="http://schemas.openxmlformats.org/officeDocument/2006/customXml" ds:itemID="{40AC1BE3-0ECC-4682-95BA-BFCE5BC2C53F}">
   <ds:schemaRefs>
-    <ds:schemaRef ds:uri="http://schemas.microsoft.com/sharepoint/v3/contenttype/forms"/>
+    <ds:schemaRef ds:uri="http://schemas.microsoft.com/office/2006/metadata/contentType"/>
+    <ds:schemaRef ds:uri="http://schemas.microsoft.com/office/2006/metadata/properties/metaAttributes"/>
+    <ds:schemaRef ds:uri="http://www.w3.org/2001/XMLSchema"/>
+    <ds:schemaRef ds:uri="http://schemas.microsoft.com/office/2006/metadata/properties"/>
+    <ds:schemaRef ds:uri="01e230a7-93a4-4d42-896c-9e0ac63adbaa"/>
+    <ds:schemaRef ds:uri="http://schemas.microsoft.com/office/2006/documentManagement/types"/>
+    <ds:schemaRef ds:uri="http://schemas.openxmlformats.org/package/2006/metadata/core-properties"/>
+    <ds:schemaRef ds:uri="http://purl.org/dc/elements/1.1/"/>
+    <ds:schemaRef ds:uri="http://purl.org/dc/terms/"/>
+    <ds:schemaRef ds:uri="http://schemas.microsoft.com/office/internal/2005/internalDocumentation"/>
   </ds:schemaRefs>
 </ds:datastoreItem>
 </file>

</xml_diff>

<commit_message>
Small change, don't change signature of function/method.
</commit_message>
<xml_diff>
--- a/OpenClosedPrinciple.pptx
+++ b/OpenClosedPrinciple.pptx
@@ -116,7 +116,7 @@
   </p:defaultTextStyle>
   <p:extLst>
     <p:ext uri="{EFAFB233-063F-42B5-8137-9DF3F51BA10A}">
-      <p15:sldGuideLst xmlns:p15="http://schemas.microsoft.com/office/powerpoint/2012/main">
+      <p15:sldGuideLst xmlns:p15="http://schemas.microsoft.com/office/powerpoint/2012/main" xmlns="">
         <p15:guide id="1" orient="horz" pos="981">
           <p15:clr>
             <a:srgbClr val="A4A3A4"/>
@@ -160,7 +160,7 @@
       </p15:sldGuideLst>
     </p:ext>
     <p:ext uri="{2D200454-40CA-4A62-9FC3-DE9A4176ACB9}">
-      <p15:notesGuideLst xmlns:p15="http://schemas.microsoft.com/office/powerpoint/2012/main">
+      <p15:notesGuideLst xmlns:p15="http://schemas.microsoft.com/office/powerpoint/2012/main" xmlns="">
         <p15:guide id="1" orient="horz" pos="2880">
           <p15:clr>
             <a:srgbClr val="A4A3A4"/>
@@ -260,7 +260,7 @@
             <a:fld id="{30BDBCCB-F02B-5948-960F-FA57E5A2C110}" type="datetimeFigureOut">
               <a:rPr lang="en-US" smtClean="0"/>
               <a:pPr/>
-              <a:t>4/8/2015</a:t>
+              <a:t>4/13/2015</a:t>
             </a:fld>
             <a:endParaRPr lang="en-US"/>
           </a:p>
@@ -336,7 +336,7 @@
     </p:spTree>
     <p:extLst>
       <p:ext uri="{BB962C8B-B14F-4D97-AF65-F5344CB8AC3E}">
-        <p14:creationId xmlns:p14="http://schemas.microsoft.com/office/powerpoint/2010/main" val="2913479443"/>
+        <p14:creationId xmlns:p14="http://schemas.microsoft.com/office/powerpoint/2010/main" xmlns="" val="2913479443"/>
       </p:ext>
     </p:extLst>
   </p:cSld>
@@ -428,7 +428,7 @@
             <a:fld id="{28EB9C19-8F4E-5D44-AF31-D0E24F8C4820}" type="datetimeFigureOut">
               <a:rPr lang="en-US" smtClean="0"/>
               <a:pPr/>
-              <a:t>4/8/2015</a:t>
+              <a:t>4/13/2015</a:t>
             </a:fld>
             <a:endParaRPr lang="en-US"/>
           </a:p>
@@ -599,7 +599,7 @@
     </p:spTree>
     <p:extLst>
       <p:ext uri="{BB962C8B-B14F-4D97-AF65-F5344CB8AC3E}">
-        <p14:creationId xmlns:p14="http://schemas.microsoft.com/office/powerpoint/2010/main" val="3494111041"/>
+        <p14:creationId xmlns:p14="http://schemas.microsoft.com/office/powerpoint/2010/main" xmlns="" val="3494111041"/>
       </p:ext>
     </p:extLst>
   </p:cSld>
@@ -775,7 +775,7 @@
     </p:spTree>
     <p:extLst>
       <p:ext uri="{BB962C8B-B14F-4D97-AF65-F5344CB8AC3E}">
-        <p14:creationId xmlns:p14="http://schemas.microsoft.com/office/powerpoint/2010/main" val="512684325"/>
+        <p14:creationId xmlns:p14="http://schemas.microsoft.com/office/powerpoint/2010/main" xmlns="" val="512684325"/>
       </p:ext>
     </p:extLst>
   </p:cSld>
@@ -1004,7 +1004,7 @@
           <a:blip r:embed="rId2">
             <a:extLst>
               <a:ext uri="{28A0092B-C50C-407E-A947-70E740481C1C}">
-                <a14:useLocalDpi xmlns:a14="http://schemas.microsoft.com/office/drawing/2010/main"/>
+                <a14:useLocalDpi xmlns:a14="http://schemas.microsoft.com/office/drawing/2010/main" xmlns=""/>
               </a:ext>
             </a:extLst>
           </a:blip>
@@ -1157,7 +1157,7 @@
           <a:blip r:embed="rId2">
             <a:extLst>
               <a:ext uri="{28A0092B-C50C-407E-A947-70E740481C1C}">
-                <a14:useLocalDpi xmlns:a14="http://schemas.microsoft.com/office/drawing/2010/main"/>
+                <a14:useLocalDpi xmlns:a14="http://schemas.microsoft.com/office/drawing/2010/main" xmlns=""/>
               </a:ext>
             </a:extLst>
           </a:blip>
@@ -1244,7 +1244,7 @@
     </p:spTree>
     <p:extLst>
       <p:ext uri="{BB962C8B-B14F-4D97-AF65-F5344CB8AC3E}">
-        <p14:creationId xmlns:p14="http://schemas.microsoft.com/office/powerpoint/2010/main" val="832573393"/>
+        <p14:creationId xmlns:p14="http://schemas.microsoft.com/office/powerpoint/2010/main" xmlns="" val="832573393"/>
       </p:ext>
     </p:extLst>
   </p:cSld>
@@ -1323,7 +1323,7 @@
     </p:spTree>
     <p:extLst>
       <p:ext uri="{BB962C8B-B14F-4D97-AF65-F5344CB8AC3E}">
-        <p14:creationId xmlns:p14="http://schemas.microsoft.com/office/powerpoint/2010/main" val="1128509019"/>
+        <p14:creationId xmlns:p14="http://schemas.microsoft.com/office/powerpoint/2010/main" xmlns="" val="1128509019"/>
       </p:ext>
     </p:extLst>
   </p:cSld>
@@ -1410,7 +1410,7 @@
     </p:spTree>
     <p:extLst>
       <p:ext uri="{BB962C8B-B14F-4D97-AF65-F5344CB8AC3E}">
-        <p14:creationId xmlns:p14="http://schemas.microsoft.com/office/powerpoint/2010/main" val="2133151345"/>
+        <p14:creationId xmlns:p14="http://schemas.microsoft.com/office/powerpoint/2010/main" xmlns="" val="2133151345"/>
       </p:ext>
     </p:extLst>
   </p:cSld>
@@ -1457,7 +1457,7 @@
           <a:blip r:embed="rId2">
             <a:extLst>
               <a:ext uri="{28A0092B-C50C-407E-A947-70E740481C1C}">
-                <a14:useLocalDpi xmlns:a14="http://schemas.microsoft.com/office/drawing/2010/main" val="0"/>
+                <a14:useLocalDpi xmlns:a14="http://schemas.microsoft.com/office/drawing/2010/main" xmlns="" val="0"/>
               </a:ext>
             </a:extLst>
           </a:blip>
@@ -1663,7 +1663,7 @@
     </p:spTree>
     <p:extLst>
       <p:ext uri="{BB962C8B-B14F-4D97-AF65-F5344CB8AC3E}">
-        <p14:creationId xmlns:p14="http://schemas.microsoft.com/office/powerpoint/2010/main" val="2784730911"/>
+        <p14:creationId xmlns:p14="http://schemas.microsoft.com/office/powerpoint/2010/main" xmlns="" val="2784730911"/>
       </p:ext>
     </p:extLst>
   </p:cSld>
@@ -1707,7 +1707,7 @@
           <a:blip r:embed="rId3">
             <a:extLst>
               <a:ext uri="{28A0092B-C50C-407E-A947-70E740481C1C}">
-                <a14:useLocalDpi xmlns:a14="http://schemas.microsoft.com/office/drawing/2010/main"/>
+                <a14:useLocalDpi xmlns:a14="http://schemas.microsoft.com/office/drawing/2010/main" xmlns=""/>
               </a:ext>
             </a:extLst>
           </a:blip>
@@ -1908,7 +1908,7 @@
     </p:spTree>
     <p:extLst>
       <p:ext uri="{BB962C8B-B14F-4D97-AF65-F5344CB8AC3E}">
-        <p14:creationId xmlns:p14="http://schemas.microsoft.com/office/powerpoint/2010/main" val="320957787"/>
+        <p14:creationId xmlns:p14="http://schemas.microsoft.com/office/powerpoint/2010/main" xmlns="" val="320957787"/>
       </p:ext>
     </p:extLst>
   </p:cSld>
@@ -2121,7 +2121,7 @@
     </p:spTree>
     <p:extLst>
       <p:ext uri="{BB962C8B-B14F-4D97-AF65-F5344CB8AC3E}">
-        <p14:creationId xmlns:p14="http://schemas.microsoft.com/office/powerpoint/2010/main" val="9019129"/>
+        <p14:creationId xmlns:p14="http://schemas.microsoft.com/office/powerpoint/2010/main" xmlns="" val="9019129"/>
       </p:ext>
     </p:extLst>
   </p:cSld>
@@ -2445,7 +2445,7 @@
     </p:spTree>
     <p:extLst>
       <p:ext uri="{BB962C8B-B14F-4D97-AF65-F5344CB8AC3E}">
-        <p14:creationId xmlns:p14="http://schemas.microsoft.com/office/powerpoint/2010/main" val="1572874090"/>
+        <p14:creationId xmlns:p14="http://schemas.microsoft.com/office/powerpoint/2010/main" xmlns="" val="1572874090"/>
       </p:ext>
     </p:extLst>
   </p:cSld>
@@ -3427,7 +3427,7 @@
     </p:spTree>
     <p:extLst>
       <p:ext uri="{BB962C8B-B14F-4D97-AF65-F5344CB8AC3E}">
-        <p14:creationId xmlns:p14="http://schemas.microsoft.com/office/powerpoint/2010/main" val="4190611823"/>
+        <p14:creationId xmlns:p14="http://schemas.microsoft.com/office/powerpoint/2010/main" xmlns="" val="4190611823"/>
       </p:ext>
     </p:extLst>
   </p:cSld>
@@ -3601,7 +3601,7 @@
           <a:blip r:embed="rId2">
             <a:extLst>
               <a:ext uri="{28A0092B-C50C-407E-A947-70E740481C1C}">
-                <a14:useLocalDpi xmlns:a14="http://schemas.microsoft.com/office/drawing/2010/main"/>
+                <a14:useLocalDpi xmlns:a14="http://schemas.microsoft.com/office/drawing/2010/main" xmlns=""/>
               </a:ext>
             </a:extLst>
           </a:blip>
@@ -3725,7 +3725,7 @@
     </p:spTree>
     <p:extLst>
       <p:ext uri="{BB962C8B-B14F-4D97-AF65-F5344CB8AC3E}">
-        <p14:creationId xmlns:p14="http://schemas.microsoft.com/office/powerpoint/2010/main" val="1609856632"/>
+        <p14:creationId xmlns:p14="http://schemas.microsoft.com/office/powerpoint/2010/main" xmlns="" val="1609856632"/>
       </p:ext>
     </p:extLst>
   </p:cSld>
@@ -4024,7 +4024,7 @@
           <a:blip r:embed="rId15">
             <a:extLst>
               <a:ext uri="{28A0092B-C50C-407E-A947-70E740481C1C}">
-                <a14:useLocalDpi xmlns:a14="http://schemas.microsoft.com/office/drawing/2010/main"/>
+                <a14:useLocalDpi xmlns:a14="http://schemas.microsoft.com/office/drawing/2010/main" xmlns=""/>
               </a:ext>
             </a:extLst>
           </a:blip>
@@ -4596,7 +4596,7 @@
     </p:spTree>
     <p:extLst>
       <p:ext uri="{BB962C8B-B14F-4D97-AF65-F5344CB8AC3E}">
-        <p14:creationId xmlns:p14="http://schemas.microsoft.com/office/powerpoint/2010/main" val="1142822994"/>
+        <p14:creationId xmlns:p14="http://schemas.microsoft.com/office/powerpoint/2010/main" xmlns="" val="1142822994"/>
       </p:ext>
     </p:extLst>
   </p:cSld>
@@ -4649,15 +4649,7 @@
           <a:p>
             <a:r>
               <a:rPr lang="nb-NO" dirty="0" smtClean="0"/>
-              <a:t>Stammer fra </a:t>
-            </a:r>
-            <a:r>
-              <a:rPr lang="nb-NO" dirty="0" smtClean="0"/>
-              <a:t>tidlig </a:t>
-            </a:r>
-            <a:r>
-              <a:rPr lang="nb-NO" dirty="0" smtClean="0"/>
-              <a:t>objektorientering</a:t>
+              <a:t>Stammer fra tidlig objektorientering</a:t>
             </a:r>
           </a:p>
           <a:p>
@@ -4697,7 +4689,6 @@
               <a:rPr lang="nb-NO" dirty="0" smtClean="0"/>
               <a:t> språk med multippel arv og templating</a:t>
             </a:r>
-            <a:endParaRPr lang="nb-NO" dirty="0" smtClean="0"/>
           </a:p>
           <a:p>
             <a:r>
@@ -4710,15 +4701,7 @@
             </a:r>
             <a:r>
               <a:rPr lang="nb-NO" dirty="0" smtClean="0"/>
-              <a:t> fungerer ikke like </a:t>
-            </a:r>
-            <a:r>
-              <a:rPr lang="nb-NO" dirty="0" smtClean="0"/>
-              <a:t>godt i C# og </a:t>
-            </a:r>
-            <a:r>
-              <a:rPr lang="nb-NO" dirty="0" smtClean="0"/>
-              <a:t>Java som i </a:t>
+              <a:t> fungerer ikke like godt i C# og Java som i </a:t>
             </a:r>
             <a:r>
               <a:rPr lang="nb-NO" dirty="0" err="1" smtClean="0"/>
@@ -4726,21 +4709,8 @@
             </a:r>
             <a:r>
               <a:rPr lang="nb-NO" dirty="0" smtClean="0"/>
-              <a:t>, </a:t>
-            </a:r>
-            <a:r>
-              <a:rPr lang="nb-NO" dirty="0" smtClean="0"/>
-              <a:t>men </a:t>
-            </a:r>
-            <a:r>
-              <a:rPr lang="nb-NO" dirty="0" smtClean="0"/>
-              <a:t>prinsippene er riktige og viktige</a:t>
-            </a:r>
-            <a:r>
-              <a:rPr lang="nb-NO" dirty="0" smtClean="0"/>
-              <a:t>.</a:t>
-            </a:r>
-            <a:endParaRPr lang="nb-NO" dirty="0" smtClean="0"/>
+              <a:t>, men prinsippene er riktige og viktige.</a:t>
+            </a:r>
           </a:p>
           <a:p>
             <a:r>
@@ -4753,25 +4723,13 @@
             </a:r>
             <a:r>
               <a:rPr lang="nb-NO" dirty="0" smtClean="0"/>
-              <a:t>» </a:t>
-            </a:r>
+              <a:t>» er etterfølger etter de grunnleggende prinsippene</a:t>
+            </a:r>
+          </a:p>
+          <a:p>
             <a:r>
               <a:rPr lang="nb-NO" dirty="0" smtClean="0"/>
-              <a:t>er etterfølger etter de grunnleggende prinsippene</a:t>
-            </a:r>
-          </a:p>
-          <a:p>
-            <a:r>
-              <a:rPr lang="nb-NO" dirty="0" smtClean="0"/>
-              <a:t>Ikke </a:t>
-            </a:r>
-            <a:r>
-              <a:rPr lang="nb-NO" dirty="0" smtClean="0"/>
-              <a:t>mulig eller ønskelig </a:t>
-            </a:r>
-            <a:r>
-              <a:rPr lang="nb-NO" dirty="0" smtClean="0"/>
-              <a:t>å følge OCP 100%</a:t>
+              <a:t>Ikke mulig eller ønskelig å følge OCP 100%</a:t>
             </a:r>
           </a:p>
           <a:p>
@@ -4874,7 +4832,7 @@
     </p:spTree>
     <p:extLst>
       <p:ext uri="{BB962C8B-B14F-4D97-AF65-F5344CB8AC3E}">
-        <p14:creationId xmlns:p14="http://schemas.microsoft.com/office/powerpoint/2010/main" val="1037070141"/>
+        <p14:creationId xmlns:p14="http://schemas.microsoft.com/office/powerpoint/2010/main" xmlns="" val="1037070141"/>
       </p:ext>
     </p:extLst>
   </p:cSld>
@@ -4949,22 +4907,14 @@
             <a:pPr lvl="1"/>
             <a:r>
               <a:rPr lang="nb-NO" dirty="0" smtClean="0"/>
-              <a:t>Ikke nødvendigvis </a:t>
-            </a:r>
+              <a:t>Ikke nødvendigvis arv</a:t>
+            </a:r>
+          </a:p>
+          <a:p>
+            <a:pPr lvl="1"/>
             <a:r>
               <a:rPr lang="nb-NO" dirty="0" smtClean="0"/>
-              <a:t>arv</a:t>
-            </a:r>
-          </a:p>
-          <a:p>
-            <a:pPr lvl="1"/>
-            <a:r>
-              <a:rPr lang="nb-NO" dirty="0" smtClean="0"/>
-              <a:t>Abstraksjon</a:t>
-            </a:r>
-            <a:r>
-              <a:rPr lang="nb-NO" dirty="0" smtClean="0"/>
-              <a:t>, </a:t>
+              <a:t>Abstraksjon, </a:t>
             </a:r>
             <a:r>
               <a:rPr lang="nb-NO" dirty="0" err="1" smtClean="0"/>
@@ -5006,11 +4956,7 @@
             <a:pPr lvl="1"/>
             <a:r>
               <a:rPr lang="nb-NO" dirty="0" smtClean="0"/>
-              <a:t>Opprinnelig prinsipp var at kildekode skal være stengt for endringer. </a:t>
-            </a:r>
-            <a:r>
-              <a:rPr lang="nb-NO" dirty="0" smtClean="0"/>
-              <a:t>Dette er for strengt.</a:t>
+              <a:t>Opprinnelig prinsipp var at kildekode skal være stengt for endringer. Dette er for strengt.</a:t>
             </a:r>
           </a:p>
           <a:p>
@@ -5025,25 +4971,8 @@
             </a:r>
             <a:r>
               <a:rPr lang="nb-NO" dirty="0" smtClean="0"/>
-              <a:t>». </a:t>
-            </a:r>
-            <a:r>
-              <a:rPr lang="nb-NO" dirty="0" smtClean="0"/>
-              <a:t>Bestemme hva </a:t>
-            </a:r>
-            <a:r>
-              <a:rPr lang="nb-NO" dirty="0" smtClean="0"/>
-              <a:t>som skal være stengt, hva </a:t>
-            </a:r>
-            <a:r>
-              <a:rPr lang="nb-NO" dirty="0" smtClean="0"/>
-              <a:t>som skal være </a:t>
-            </a:r>
-            <a:r>
-              <a:rPr lang="nb-NO" dirty="0" smtClean="0"/>
-              <a:t>åpent, og hvordan det skal være åpent.</a:t>
-            </a:r>
-            <a:endParaRPr lang="nb-NO" dirty="0" smtClean="0"/>
+              <a:t>». Bestemme hva som skal være stengt, hva som skal være åpent, og hvordan det skal være åpent.</a:t>
+            </a:r>
           </a:p>
           <a:p>
             <a:pPr lvl="1"/>
@@ -5056,18 +4985,18 @@
             <a:pPr lvl="2"/>
             <a:r>
               <a:rPr lang="nb-NO" dirty="0" smtClean="0"/>
-              <a:t>Ikke nye </a:t>
-            </a:r>
+              <a:t>Ikke nye funksjoner/metoder</a:t>
+            </a:r>
+          </a:p>
+          <a:p>
+            <a:pPr lvl="2"/>
             <a:r>
               <a:rPr lang="nb-NO" dirty="0" smtClean="0"/>
-              <a:t>funksjoner/metoder</a:t>
-            </a:r>
-          </a:p>
-          <a:p>
-            <a:pPr lvl="2"/>
+              <a:t>Ikke endre </a:t>
+            </a:r>
             <a:r>
               <a:rPr lang="nb-NO" dirty="0" smtClean="0"/>
-              <a:t>Ikke endre funksjoner/metoder</a:t>
+              <a:t>signatur på funksjoner/metoder</a:t>
             </a:r>
             <a:endParaRPr lang="nb-NO" dirty="0" smtClean="0"/>
           </a:p>
@@ -5165,7 +5094,7 @@
     </p:spTree>
     <p:extLst>
       <p:ext uri="{BB962C8B-B14F-4D97-AF65-F5344CB8AC3E}">
-        <p14:creationId xmlns:p14="http://schemas.microsoft.com/office/powerpoint/2010/main" val="3506142794"/>
+        <p14:creationId xmlns:p14="http://schemas.microsoft.com/office/powerpoint/2010/main" xmlns="" val="3506142794"/>
       </p:ext>
     </p:extLst>
   </p:cSld>
@@ -5378,7 +5307,7 @@
     </p:spTree>
     <p:extLst>
       <p:ext uri="{BB962C8B-B14F-4D97-AF65-F5344CB8AC3E}">
-        <p14:creationId xmlns:p14="http://schemas.microsoft.com/office/powerpoint/2010/main" val="3393926942"/>
+        <p14:creationId xmlns:p14="http://schemas.microsoft.com/office/powerpoint/2010/main" xmlns="" val="3393926942"/>
       </p:ext>
     </p:extLst>
   </p:cSld>
@@ -6361,23 +6290,6 @@
 </file>
 
 <file path=customXml/item1.xml><?xml version="1.0" encoding="utf-8"?>
-<?mso-contentType ?>
-<FormTemplates xmlns="http://schemas.microsoft.com/sharepoint/v3/contenttype/forms">
-  <Display>DocumentLibraryForm</Display>
-  <Edit>DocumentLibraryForm</Edit>
-  <New>DocumentLibraryForm</New>
-</FormTemplates>
-</file>
-
-<file path=customXml/item2.xml><?xml version="1.0" encoding="utf-8"?>
-<p:properties xmlns:p="http://schemas.microsoft.com/office/2006/metadata/properties" xmlns:xsi="http://www.w3.org/2001/XMLSchema-instance">
-  <documentManagement>
-    <TopicId xmlns="01e230a7-93a4-4d42-896c-9e0ac63adbaa" xsi:nil="true"/>
-  </documentManagement>
-</p:properties>
-</file>
-
-<file path=customXml/item3.xml><?xml version="1.0" encoding="utf-8"?>
 <ct:contentTypeSchema xmlns:ct="http://schemas.microsoft.com/office/2006/metadata/contentType" xmlns:ma="http://schemas.microsoft.com/office/2006/metadata/properties/metaAttributes" ct:_="" ma:_="" ma:contentTypeName="Document" ma:contentTypeID="0x0101003AEC10B5DB4D4C498C6092330F2E2392" ma:contentTypeVersion="0" ma:contentTypeDescription="Create a new document." ma:contentTypeScope="" ma:versionID="05b8c8acf6199673415ecb207baa50c7">
   <xsd:schema xmlns:xsd="http://www.w3.org/2001/XMLSchema" xmlns:p="http://schemas.microsoft.com/office/2006/metadata/properties" xmlns:ns2="01e230a7-93a4-4d42-896c-9e0ac63adbaa" targetNamespace="http://schemas.microsoft.com/office/2006/metadata/properties" ma:root="true" ma:fieldsID="e7064f479bd5ad9960cca567e0686db3" ns2:_="">
     <xsd:import namespace="01e230a7-93a4-4d42-896c-9e0ac63adbaa"/>
@@ -6437,10 +6349,36 @@
 </ct:contentTypeSchema>
 </file>
 
+<file path=customXml/item2.xml><?xml version="1.0" encoding="utf-8"?>
+<p:properties xmlns:p="http://schemas.microsoft.com/office/2006/metadata/properties" xmlns:xsi="http://www.w3.org/2001/XMLSchema-instance">
+  <documentManagement>
+    <TopicId xmlns="01e230a7-93a4-4d42-896c-9e0ac63adbaa" xsi:nil="true"/>
+  </documentManagement>
+</p:properties>
+</file>
+
+<file path=customXml/item3.xml><?xml version="1.0" encoding="utf-8"?>
+<?mso-contentType ?>
+<FormTemplates xmlns="http://schemas.microsoft.com/sharepoint/v3/contenttype/forms">
+  <Display>DocumentLibraryForm</Display>
+  <Edit>DocumentLibraryForm</Edit>
+  <New>DocumentLibraryForm</New>
+</FormTemplates>
+</file>
+
 <file path=customXml/itemProps1.xml><?xml version="1.0" encoding="utf-8"?>
-<ds:datastoreItem xmlns:ds="http://schemas.openxmlformats.org/officeDocument/2006/customXml" ds:itemID="{AB3985EB-A20D-413F-870C-F434910CF0FB}">
+<ds:datastoreItem xmlns:ds="http://schemas.openxmlformats.org/officeDocument/2006/customXml" ds:itemID="{40AC1BE3-0ECC-4682-95BA-BFCE5BC2C53F}">
   <ds:schemaRefs>
-    <ds:schemaRef ds:uri="http://schemas.microsoft.com/sharepoint/v3/contenttype/forms"/>
+    <ds:schemaRef ds:uri="http://schemas.microsoft.com/office/2006/metadata/contentType"/>
+    <ds:schemaRef ds:uri="http://schemas.microsoft.com/office/2006/metadata/properties/metaAttributes"/>
+    <ds:schemaRef ds:uri="http://www.w3.org/2001/XMLSchema"/>
+    <ds:schemaRef ds:uri="http://schemas.microsoft.com/office/2006/metadata/properties"/>
+    <ds:schemaRef ds:uri="01e230a7-93a4-4d42-896c-9e0ac63adbaa"/>
+    <ds:schemaRef ds:uri="http://schemas.microsoft.com/office/2006/documentManagement/types"/>
+    <ds:schemaRef ds:uri="http://schemas.openxmlformats.org/package/2006/metadata/core-properties"/>
+    <ds:schemaRef ds:uri="http://purl.org/dc/elements/1.1/"/>
+    <ds:schemaRef ds:uri="http://purl.org/dc/terms/"/>
+    <ds:schemaRef ds:uri="http://schemas.microsoft.com/office/internal/2005/internalDocumentation"/>
   </ds:schemaRefs>
 </ds:datastoreItem>
 </file>
@@ -6461,18 +6399,9 @@
 </file>
 
 <file path=customXml/itemProps3.xml><?xml version="1.0" encoding="utf-8"?>
-<ds:datastoreItem xmlns:ds="http://schemas.openxmlformats.org/officeDocument/2006/customXml" ds:itemID="{40AC1BE3-0ECC-4682-95BA-BFCE5BC2C53F}">
+<ds:datastoreItem xmlns:ds="http://schemas.openxmlformats.org/officeDocument/2006/customXml" ds:itemID="{AB3985EB-A20D-413F-870C-F434910CF0FB}">
   <ds:schemaRefs>
-    <ds:schemaRef ds:uri="http://schemas.microsoft.com/office/2006/metadata/contentType"/>
-    <ds:schemaRef ds:uri="http://schemas.microsoft.com/office/2006/metadata/properties/metaAttributes"/>
-    <ds:schemaRef ds:uri="http://www.w3.org/2001/XMLSchema"/>
-    <ds:schemaRef ds:uri="http://schemas.microsoft.com/office/2006/metadata/properties"/>
-    <ds:schemaRef ds:uri="01e230a7-93a4-4d42-896c-9e0ac63adbaa"/>
-    <ds:schemaRef ds:uri="http://schemas.microsoft.com/office/2006/documentManagement/types"/>
-    <ds:schemaRef ds:uri="http://schemas.openxmlformats.org/package/2006/metadata/core-properties"/>
-    <ds:schemaRef ds:uri="http://purl.org/dc/elements/1.1/"/>
-    <ds:schemaRef ds:uri="http://purl.org/dc/terms/"/>
-    <ds:schemaRef ds:uri="http://schemas.microsoft.com/office/internal/2005/internalDocumentation"/>
+    <ds:schemaRef ds:uri="http://schemas.microsoft.com/sharepoint/v3/contenttype/forms"/>
   </ds:schemaRefs>
 </ds:datastoreItem>
 </file>

</xml_diff>